<commit_message>
Changes to the PMPNN chapter.
</commit_message>
<xml_diff>
--- a/powerpoint-graphics/pmpnn_graph.pptx
+++ b/powerpoint-graphics/pmpnn_graph.pptx
@@ -7380,6 +7380,9 @@
               <a:avLst/>
             </a:prstGeom>
             <a:ln>
+              <a:solidFill>
+                <a:srgbClr val="7F7F7F"/>
+              </a:solidFill>
               <a:tailEnd type="triangle"/>
             </a:ln>
           </p:spPr>
@@ -7456,6 +7459,9 @@
               <a:avLst/>
             </a:prstGeom>
             <a:ln>
+              <a:solidFill>
+                <a:srgbClr val="7F7F7F"/>
+              </a:solidFill>
               <a:tailEnd type="triangle"/>
             </a:ln>
           </p:spPr>
@@ -7489,7 +7495,7 @@
           <p:spPr>
             <a:xfrm>
               <a:off x="2901969" y="6115509"/>
-              <a:ext cx="1686167" cy="276999"/>
+              <a:ext cx="1326004" cy="276999"/>
             </a:xfrm>
             <a:prstGeom prst="rect">
               <a:avLst/>
@@ -7506,12 +7512,49 @@
                 <a:rPr lang="en-DE" sz="1200" dirty="0">
                   <a:latin typeface="LM Roman 12" pitchFamily="2" charset="77"/>
                 </a:rPr>
-                <a:t>Symmetry Remodeling</a:t>
+                <a:t>Graph Reduction</a:t>
               </a:r>
             </a:p>
           </p:txBody>
         </p:sp>
       </p:grpSp>
+      <p:sp>
+        <p:nvSpPr>
+          <p:cNvPr id="69" name="TextBox 68">
+            <a:extLst>
+              <a:ext uri="{FF2B5EF4-FFF2-40B4-BE49-F238E27FC236}">
+                <a16:creationId xmlns:a16="http://schemas.microsoft.com/office/drawing/2014/main" id="{D865C352-8167-6776-37C6-33F16FF59E2F}"/>
+              </a:ext>
+            </a:extLst>
+          </p:cNvPr>
+          <p:cNvSpPr txBox="1"/>
+          <p:nvPr/>
+        </p:nvSpPr>
+        <p:spPr>
+          <a:xfrm>
+            <a:off x="347870" y="-1113183"/>
+            <a:ext cx="184731" cy="369332"/>
+          </a:xfrm>
+          <a:prstGeom prst="rect">
+            <a:avLst/>
+          </a:prstGeom>
+          <a:noFill/>
+          <a:ln>
+            <a:solidFill>
+              <a:srgbClr val="7F7F7F"/>
+            </a:solidFill>
+          </a:ln>
+        </p:spPr>
+        <p:txBody>
+          <a:bodyPr wrap="none" rtlCol="0">
+            <a:spAutoFit/>
+          </a:bodyPr>
+          <a:lstStyle/>
+          <a:p>
+            <a:endParaRPr lang="en-DE" dirty="0"/>
+          </a:p>
+        </p:txBody>
+      </p:sp>
     </p:spTree>
     <p:extLst>
       <p:ext uri="{BB962C8B-B14F-4D97-AF65-F5344CB8AC3E}">

</xml_diff>